<commit_message>
Slide Unit 1: Statistical concept (completed)
</commit_message>
<xml_diff>
--- a/Data Science resources/Introduction to Machine Learning/Slides/Slide Unit 1/1. Statistical concept.pptx
+++ b/Data Science resources/Introduction to Machine Learning/Slides/Slide Unit 1/1. Statistical concept.pptx
@@ -259,7 +259,7 @@
           <a:p>
             <a:fld id="{E4DABB7E-5FD5-4FD4-8200-24B5A1924914}" type="datetimeFigureOut">
               <a:rPr lang="en-US" smtClean="0"/>
-              <a:t>08-Sep-21</a:t>
+              <a:t>03-May-24</a:t>
             </a:fld>
             <a:endParaRPr lang="en-US"/>
           </a:p>
@@ -436,7 +436,7 @@
           <a:p>
             <a:fld id="{9BDC6C4C-B340-4EE6-8690-61E4F94D1E11}" type="datetimeFigureOut">
               <a:rPr lang="en-US" smtClean="0"/>
-              <a:t>08-Sep-21</a:t>
+              <a:t>03-May-24</a:t>
             </a:fld>
             <a:endParaRPr lang="en-US"/>
           </a:p>
@@ -2110,7 +2110,7 @@
           </p:cNvGraphicFramePr>
           <p:nvPr userDrawn="1">
             <p:custDataLst>
-              <p:tags r:id="rId1"/>
+              <p:tags r:id="rId2"/>
             </p:custDataLst>
           </p:nvPr>
         </p:nvGraphicFramePr>
@@ -2122,12 +2122,12 @@
           <a:graphicData uri="http://schemas.openxmlformats.org/presentationml/2006/ole">
             <mc:AlternateContent xmlns:mc="http://schemas.openxmlformats.org/markup-compatibility/2006">
               <mc:Choice xmlns:v="urn:schemas-microsoft-com:vml" Requires="v">
-                <p:oleObj name="think-cell Slide" r:id="rId3" imgW="425" imgH="426" progId="TCLayout.ActiveDocument.1">
+                <p:oleObj spid="_x0000_s2050" name="think-cell Slide" r:id="rId4" imgW="425" imgH="426" progId="TCLayout.ActiveDocument.1">
                   <p:embed/>
                 </p:oleObj>
               </mc:Choice>
               <mc:Fallback>
-                <p:oleObj name="think-cell Slide" r:id="rId3" imgW="425" imgH="426" progId="TCLayout.ActiveDocument.1">
+                <p:oleObj name="think-cell Slide" r:id="rId4" imgW="425" imgH="426" progId="TCLayout.ActiveDocument.1">
                   <p:embed/>
                   <p:pic>
                     <p:nvPicPr>
@@ -2136,7 +2136,7 @@
                       <p:nvPr/>
                     </p:nvPicPr>
                     <p:blipFill>
-                      <a:blip r:embed="rId4"/>
+                      <a:blip r:embed="rId5"/>
                       <a:stretch>
                         <a:fillRect/>
                       </a:stretch>
@@ -2341,7 +2341,7 @@
           <p:nvPr userDrawn="1"/>
         </p:nvPicPr>
         <p:blipFill rotWithShape="1">
-          <a:blip r:embed="rId5">
+          <a:blip r:embed="rId6">
             <a:extLst>
               <a:ext uri="{28A0092B-C50C-407E-A947-70E740481C1C}">
                 <a14:useLocalDpi xmlns:a14="http://schemas.microsoft.com/office/drawing/2010/main" val="0"/>
@@ -3141,216 +3141,12 @@
           </a:p>
         </p:txBody>
       </p:sp>
-      <p:sp>
-        <p:nvSpPr>
-          <p:cNvPr id="6" name="TextBox 5">
+      <p:pic>
+        <p:nvPicPr>
+          <p:cNvPr id="11" name="Picture 10" descr="A logo with text on it&#10;&#10;Description automatically generated">
             <a:extLst>
               <a:ext uri="{FF2B5EF4-FFF2-40B4-BE49-F238E27FC236}">
-                <a16:creationId xmlns:a16="http://schemas.microsoft.com/office/drawing/2014/main" id="{52E4E2B9-ADBD-40B7-BB28-46FFE040B61C}"/>
-              </a:ext>
-            </a:extLst>
-          </p:cNvPr>
-          <p:cNvSpPr txBox="1"/>
-          <p:nvPr userDrawn="1"/>
-        </p:nvSpPr>
-        <p:spPr>
-          <a:xfrm flipH="1">
-            <a:off x="5820012" y="3184575"/>
-            <a:ext cx="1390988" cy="584775"/>
-          </a:xfrm>
-          <a:prstGeom prst="rect">
-            <a:avLst/>
-          </a:prstGeom>
-          <a:noFill/>
-        </p:spPr>
-        <p:txBody>
-          <a:bodyPr wrap="square" rtlCol="0">
-            <a:spAutoFit/>
-          </a:bodyPr>
-          <a:lstStyle/>
-          <a:p>
-            <a:r>
-              <a:rPr lang="en-US" sz="1600" b="1" dirty="0">
-                <a:solidFill>
-                  <a:schemeClr val="tx1"/>
-                </a:solidFill>
-                <a:latin typeface="+mj-lt"/>
-                <a:cs typeface="Aharoni" panose="02010803020104030203" pitchFamily="2" charset="-79"/>
-              </a:rPr>
-              <a:t>Partnering</a:t>
-            </a:r>
-            <a:br>
-              <a:rPr lang="en-US" sz="1600" b="1" dirty="0">
-                <a:solidFill>
-                  <a:schemeClr val="tx1"/>
-                </a:solidFill>
-                <a:latin typeface="+mj-lt"/>
-                <a:cs typeface="Aharoni" panose="02010803020104030203" pitchFamily="2" charset="-79"/>
-              </a:rPr>
-            </a:br>
-            <a:r>
-              <a:rPr lang="en-US" sz="1600" b="1" dirty="0">
-                <a:solidFill>
-                  <a:schemeClr val="tx1"/>
-                </a:solidFill>
-                <a:latin typeface="+mj-lt"/>
-                <a:cs typeface="Aharoni" panose="02010803020104030203" pitchFamily="2" charset="-79"/>
-              </a:rPr>
-              <a:t>Institutions</a:t>
-            </a:r>
-            <a:endParaRPr lang="en-US" sz="500" b="1" dirty="0">
-              <a:solidFill>
-                <a:schemeClr val="tx1"/>
-              </a:solidFill>
-              <a:latin typeface="+mj-lt"/>
-              <a:cs typeface="Aharoni" panose="02010803020104030203" pitchFamily="2" charset="-79"/>
-            </a:endParaRPr>
-          </a:p>
-        </p:txBody>
-      </p:sp>
-      <p:grpSp>
-        <p:nvGrpSpPr>
-          <p:cNvPr id="26" name="Group 25">
-            <a:extLst>
-              <a:ext uri="{FF2B5EF4-FFF2-40B4-BE49-F238E27FC236}">
-                <a16:creationId xmlns:a16="http://schemas.microsoft.com/office/drawing/2014/main" id="{20CB8E11-39A4-4E1E-A579-F3F237CFBB48}"/>
-              </a:ext>
-            </a:extLst>
-          </p:cNvPr>
-          <p:cNvGrpSpPr/>
-          <p:nvPr userDrawn="1"/>
-        </p:nvGrpSpPr>
-        <p:grpSpPr>
-          <a:xfrm>
-            <a:off x="7211001" y="0"/>
-            <a:ext cx="4980999" cy="6872041"/>
-            <a:chOff x="7210999" y="-376519"/>
-            <a:chExt cx="4981000" cy="6816521"/>
-          </a:xfrm>
-        </p:grpSpPr>
-        <p:grpSp>
-          <p:nvGrpSpPr>
-            <p:cNvPr id="22" name="Group 21">
-              <a:extLst>
-                <a:ext uri="{FF2B5EF4-FFF2-40B4-BE49-F238E27FC236}">
-                  <a16:creationId xmlns:a16="http://schemas.microsoft.com/office/drawing/2014/main" id="{553FEB1D-953F-4AD5-979E-64A2E1BFFAA3}"/>
-                </a:ext>
-              </a:extLst>
-            </p:cNvPr>
-            <p:cNvGrpSpPr/>
-            <p:nvPr userDrawn="1"/>
-          </p:nvGrpSpPr>
-          <p:grpSpPr>
-            <a:xfrm>
-              <a:off x="7210999" y="-376519"/>
-              <a:ext cx="4981000" cy="6242350"/>
-              <a:chOff x="7210999" y="-19320"/>
-              <a:chExt cx="4981000" cy="6242350"/>
-            </a:xfrm>
-          </p:grpSpPr>
-          <p:pic>
-            <p:nvPicPr>
-              <p:cNvPr id="9" name="Picture 8">
-                <a:extLst>
-                  <a:ext uri="{FF2B5EF4-FFF2-40B4-BE49-F238E27FC236}">
-                    <a16:creationId xmlns:a16="http://schemas.microsoft.com/office/drawing/2014/main" id="{B8A9B711-267A-4825-AFA4-306D33323A56}"/>
-                  </a:ext>
-                </a:extLst>
-              </p:cNvPr>
-              <p:cNvPicPr/>
-              <p:nvPr/>
-            </p:nvPicPr>
-            <p:blipFill rotWithShape="1">
-              <a:blip r:embed="rId2">
-                <a:extLst>
-                  <a:ext uri="{28A0092B-C50C-407E-A947-70E740481C1C}">
-                    <a14:useLocalDpi xmlns:a14="http://schemas.microsoft.com/office/drawing/2010/main" val="0"/>
-                  </a:ext>
-                </a:extLst>
-              </a:blip>
-              <a:srcRect b="3956"/>
-              <a:stretch/>
-            </p:blipFill>
-            <p:spPr bwMode="auto">
-              <a:xfrm>
-                <a:off x="7211001" y="1204009"/>
-                <a:ext cx="4980990" cy="5019021"/>
-              </a:xfrm>
-              <a:prstGeom prst="rect">
-                <a:avLst/>
-              </a:prstGeom>
-              <a:noFill/>
-              <a:ln>
-                <a:noFill/>
-              </a:ln>
-            </p:spPr>
-          </p:pic>
-          <p:pic>
-            <p:nvPicPr>
-              <p:cNvPr id="12" name="Picture 11">
-                <a:extLst>
-                  <a:ext uri="{FF2B5EF4-FFF2-40B4-BE49-F238E27FC236}">
-                    <a16:creationId xmlns:a16="http://schemas.microsoft.com/office/drawing/2014/main" id="{FDAB62FA-DA2E-47A7-B719-956966448716}"/>
-                  </a:ext>
-                </a:extLst>
-              </p:cNvPr>
-              <p:cNvPicPr>
-                <a:picLocks noChangeAspect="1"/>
-              </p:cNvPicPr>
-              <p:nvPr userDrawn="1"/>
-            </p:nvPicPr>
-            <p:blipFill rotWithShape="1">
-              <a:blip r:embed="rId3"/>
-              <a:srcRect t="8596" b="17335"/>
-              <a:stretch/>
-            </p:blipFill>
-            <p:spPr>
-              <a:xfrm>
-                <a:off x="7210999" y="-19320"/>
-                <a:ext cx="4981000" cy="1223329"/>
-              </a:xfrm>
-              <a:prstGeom prst="rect">
-                <a:avLst/>
-              </a:prstGeom>
-            </p:spPr>
-          </p:pic>
-        </p:grpSp>
-        <p:pic>
-          <p:nvPicPr>
-            <p:cNvPr id="24" name="Picture 23">
-              <a:extLst>
-                <a:ext uri="{FF2B5EF4-FFF2-40B4-BE49-F238E27FC236}">
-                  <a16:creationId xmlns:a16="http://schemas.microsoft.com/office/drawing/2014/main" id="{9B7456BD-03D3-41B8-957B-38CB1512A39A}"/>
-                </a:ext>
-              </a:extLst>
-            </p:cNvPr>
-            <p:cNvPicPr>
-              <a:picLocks noChangeAspect="1"/>
-            </p:cNvPicPr>
-            <p:nvPr userDrawn="1"/>
-          </p:nvPicPr>
-          <p:blipFill rotWithShape="1">
-            <a:blip r:embed="rId4"/>
-            <a:srcRect l="92684" t="16179" b="22966"/>
-            <a:stretch/>
-          </p:blipFill>
-          <p:spPr>
-            <a:xfrm>
-              <a:off x="11818960" y="5850942"/>
-              <a:ext cx="364397" cy="589060"/>
-            </a:xfrm>
-            <a:prstGeom prst="rect">
-              <a:avLst/>
-            </a:prstGeom>
-          </p:spPr>
-        </p:pic>
-      </p:grpSp>
-      <p:pic>
-        <p:nvPicPr>
-          <p:cNvPr id="7" name="Picture 6">
-            <a:extLst>
-              <a:ext uri="{FF2B5EF4-FFF2-40B4-BE49-F238E27FC236}">
-                <a16:creationId xmlns:a16="http://schemas.microsoft.com/office/drawing/2014/main" id="{257237D6-3BC4-49E6-A079-9EF58A6B17EA}"/>
+                <a16:creationId xmlns:a16="http://schemas.microsoft.com/office/drawing/2014/main" id="{12E4B5EB-8A3E-4659-A0CF-C7A5C2A9608C}"/>
               </a:ext>
             </a:extLst>
           </p:cNvPr>
@@ -3359,15 +3155,22 @@
           </p:cNvPicPr>
           <p:nvPr userDrawn="1"/>
         </p:nvPicPr>
-        <p:blipFill rotWithShape="1">
-          <a:blip r:embed="rId5"/>
-          <a:srcRect t="29710" b="25953"/>
-          <a:stretch/>
+        <p:blipFill>
+          <a:blip r:embed="rId2">
+            <a:extLst>
+              <a:ext uri="{28A0092B-C50C-407E-A947-70E740481C1C}">
+                <a14:useLocalDpi xmlns:a14="http://schemas.microsoft.com/office/drawing/2010/main" val="0"/>
+              </a:ext>
+            </a:extLst>
+          </a:blip>
+          <a:stretch>
+            <a:fillRect/>
+          </a:stretch>
         </p:blipFill>
         <p:spPr>
           <a:xfrm>
-            <a:off x="7210999" y="6276829"/>
-            <a:ext cx="4727891" cy="598922"/>
+            <a:off x="7576762" y="2617384"/>
+            <a:ext cx="3429000" cy="1304925"/>
           </a:xfrm>
           <a:prstGeom prst="rect">
             <a:avLst/>
@@ -3418,7 +3221,7 @@
           </p:cNvGraphicFramePr>
           <p:nvPr userDrawn="1">
             <p:custDataLst>
-              <p:tags r:id="rId1"/>
+              <p:tags r:id="rId2"/>
             </p:custDataLst>
           </p:nvPr>
         </p:nvGraphicFramePr>
@@ -3430,12 +3233,12 @@
           <a:graphicData uri="http://schemas.openxmlformats.org/presentationml/2006/ole">
             <mc:AlternateContent xmlns:mc="http://schemas.openxmlformats.org/markup-compatibility/2006">
               <mc:Choice xmlns:v="urn:schemas-microsoft-com:vml" Requires="v">
-                <p:oleObj name="think-cell Slide" r:id="rId3" imgW="347" imgH="348" progId="TCLayout.ActiveDocument.1">
+                <p:oleObj spid="_x0000_s3074" name="think-cell Slide" r:id="rId4" imgW="347" imgH="348" progId="TCLayout.ActiveDocument.1">
                   <p:embed/>
                 </p:oleObj>
               </mc:Choice>
               <mc:Fallback>
-                <p:oleObj name="think-cell Slide" r:id="rId3" imgW="347" imgH="348" progId="TCLayout.ActiveDocument.1">
+                <p:oleObj name="think-cell Slide" r:id="rId4" imgW="347" imgH="348" progId="TCLayout.ActiveDocument.1">
                   <p:embed/>
                   <p:pic>
                     <p:nvPicPr>
@@ -3450,7 +3253,7 @@
                       <p:nvPr/>
                     </p:nvPicPr>
                     <p:blipFill>
-                      <a:blip r:embed="rId4"/>
+                      <a:blip r:embed="rId5"/>
                       <a:stretch>
                         <a:fillRect/>
                       </a:stretch>
@@ -3577,7 +3380,7 @@
           <a:p>
             <a:fld id="{C426BC5F-09C1-43F9-92E4-3807667E7453}" type="datetimeFigureOut">
               <a:rPr lang="en-US" smtClean="0"/>
-              <a:t>08-Sep-21</a:t>
+              <a:t>03-May-24</a:t>
             </a:fld>
             <a:endParaRPr lang="en-US" dirty="0"/>
           </a:p>
@@ -4856,7 +4659,7 @@
           </p:cNvGraphicFramePr>
           <p:nvPr userDrawn="1">
             <p:custDataLst>
-              <p:tags r:id="rId1"/>
+              <p:tags r:id="rId2"/>
             </p:custDataLst>
           </p:nvPr>
         </p:nvGraphicFramePr>
@@ -4868,12 +4671,12 @@
           <a:graphicData uri="http://schemas.openxmlformats.org/presentationml/2006/ole">
             <mc:AlternateContent xmlns:mc="http://schemas.openxmlformats.org/markup-compatibility/2006">
               <mc:Choice xmlns:v="urn:schemas-microsoft-com:vml" Requires="v">
-                <p:oleObj name="think-cell Slide" r:id="rId3" imgW="347" imgH="348" progId="TCLayout.ActiveDocument.1">
+                <p:oleObj spid="_x0000_s4098" name="think-cell Slide" r:id="rId4" imgW="347" imgH="348" progId="TCLayout.ActiveDocument.1">
                   <p:embed/>
                 </p:oleObj>
               </mc:Choice>
               <mc:Fallback>
-                <p:oleObj name="think-cell Slide" r:id="rId3" imgW="347" imgH="348" progId="TCLayout.ActiveDocument.1">
+                <p:oleObj name="think-cell Slide" r:id="rId4" imgW="347" imgH="348" progId="TCLayout.ActiveDocument.1">
                   <p:embed/>
                   <p:pic>
                     <p:nvPicPr>
@@ -4888,7 +4691,7 @@
                       <p:nvPr/>
                     </p:nvPicPr>
                     <p:blipFill>
-                      <a:blip r:embed="rId4"/>
+                      <a:blip r:embed="rId5"/>
                       <a:stretch>
                         <a:fillRect/>
                       </a:stretch>
@@ -4949,7 +4752,7 @@
           <a:p>
             <a:fld id="{92F64031-640B-4962-8CF9-EAD8AB4A604D}" type="datetimeFigureOut">
               <a:rPr lang="en-GB" smtClean="0"/>
-              <a:t>08/09/2021</a:t>
+              <a:t>03/05/2024</a:t>
             </a:fld>
             <a:endParaRPr lang="en-GB"/>
           </a:p>
@@ -5048,7 +4851,7 @@
           </p:cNvGraphicFramePr>
           <p:nvPr userDrawn="1">
             <p:custDataLst>
-              <p:tags r:id="rId1"/>
+              <p:tags r:id="rId2"/>
             </p:custDataLst>
           </p:nvPr>
         </p:nvGraphicFramePr>
@@ -5060,12 +4863,12 @@
           <a:graphicData uri="http://schemas.openxmlformats.org/presentationml/2006/ole">
             <mc:AlternateContent xmlns:mc="http://schemas.openxmlformats.org/markup-compatibility/2006">
               <mc:Choice xmlns:v="urn:schemas-microsoft-com:vml" Requires="v">
-                <p:oleObj name="think-cell Slide" r:id="rId3" imgW="425" imgH="426" progId="TCLayout.ActiveDocument.1">
+                <p:oleObj spid="_x0000_s6146" name="think-cell Slide" r:id="rId4" imgW="425" imgH="426" progId="TCLayout.ActiveDocument.1">
                   <p:embed/>
                 </p:oleObj>
               </mc:Choice>
               <mc:Fallback>
-                <p:oleObj name="think-cell Slide" r:id="rId3" imgW="425" imgH="426" progId="TCLayout.ActiveDocument.1">
+                <p:oleObj name="think-cell Slide" r:id="rId4" imgW="425" imgH="426" progId="TCLayout.ActiveDocument.1">
                   <p:embed/>
                   <p:pic>
                     <p:nvPicPr>
@@ -5074,7 +4877,7 @@
                       <p:nvPr/>
                     </p:nvPicPr>
                     <p:blipFill>
-                      <a:blip r:embed="rId4"/>
+                      <a:blip r:embed="rId5"/>
                       <a:stretch>
                         <a:fillRect/>
                       </a:stretch>
@@ -5268,10 +5071,10 @@
       </p:sp>
       <p:pic>
         <p:nvPicPr>
-          <p:cNvPr id="13" name="Picture 12">
+          <p:cNvPr id="7" name="Picture 6" descr="A poster for a college&#10;&#10;Description automatically generated">
             <a:extLst>
               <a:ext uri="{FF2B5EF4-FFF2-40B4-BE49-F238E27FC236}">
-                <a16:creationId xmlns:a16="http://schemas.microsoft.com/office/drawing/2014/main" id="{A6F6840C-DE8F-4983-AB01-20F2DF0D4848}"/>
+                <a16:creationId xmlns:a16="http://schemas.microsoft.com/office/drawing/2014/main" id="{A19EE5A1-77D6-4FB6-AF8A-B8A9D8299850}"/>
               </a:ext>
             </a:extLst>
           </p:cNvPr>
@@ -5280,15 +5083,22 @@
           </p:cNvPicPr>
           <p:nvPr userDrawn="1"/>
         </p:nvPicPr>
-        <p:blipFill rotWithShape="1">
-          <a:blip r:embed="rId5"/>
-          <a:srcRect t="7027"/>
-          <a:stretch/>
+        <p:blipFill>
+          <a:blip r:embed="rId6" cstate="print">
+            <a:extLst>
+              <a:ext uri="{28A0092B-C50C-407E-A947-70E740481C1C}">
+                <a14:useLocalDpi xmlns:a14="http://schemas.microsoft.com/office/drawing/2010/main" val="0"/>
+              </a:ext>
+            </a:extLst>
+          </a:blip>
+          <a:stretch>
+            <a:fillRect/>
+          </a:stretch>
         </p:blipFill>
         <p:spPr>
           <a:xfrm>
-            <a:off x="48126" y="808613"/>
-            <a:ext cx="11998993" cy="5240774"/>
+            <a:off x="0" y="279791"/>
+            <a:ext cx="5994015" cy="5994015"/>
           </a:xfrm>
           <a:prstGeom prst="rect">
             <a:avLst/>
@@ -5515,7 +5325,7 @@
           </p:cNvGraphicFramePr>
           <p:nvPr userDrawn="1">
             <p:custDataLst>
-              <p:tags r:id="rId1"/>
+              <p:tags r:id="rId2"/>
             </p:custDataLst>
           </p:nvPr>
         </p:nvGraphicFramePr>
@@ -5527,12 +5337,12 @@
           <a:graphicData uri="http://schemas.openxmlformats.org/presentationml/2006/ole">
             <mc:AlternateContent xmlns:mc="http://schemas.openxmlformats.org/markup-compatibility/2006">
               <mc:Choice xmlns:v="urn:schemas-microsoft-com:vml" Requires="v">
-                <p:oleObj name="think-cell Slide" r:id="rId3" imgW="347" imgH="348" progId="TCLayout.ActiveDocument.1">
+                <p:oleObj spid="_x0000_s7170" name="think-cell Slide" r:id="rId4" imgW="347" imgH="348" progId="TCLayout.ActiveDocument.1">
                   <p:embed/>
                 </p:oleObj>
               </mc:Choice>
               <mc:Fallback>
-                <p:oleObj name="think-cell Slide" r:id="rId3" imgW="347" imgH="348" progId="TCLayout.ActiveDocument.1">
+                <p:oleObj name="think-cell Slide" r:id="rId4" imgW="347" imgH="348" progId="TCLayout.ActiveDocument.1">
                   <p:embed/>
                   <p:pic>
                     <p:nvPicPr>
@@ -5547,7 +5357,7 @@
                       <p:nvPr/>
                     </p:nvPicPr>
                     <p:blipFill>
-                      <a:blip r:embed="rId4"/>
+                      <a:blip r:embed="rId5"/>
                       <a:stretch>
                         <a:fillRect/>
                       </a:stretch>
@@ -5674,7 +5484,7 @@
           <a:p>
             <a:fld id="{C426BC5F-09C1-43F9-92E4-3807667E7453}" type="datetimeFigureOut">
               <a:rPr lang="en-US" smtClean="0"/>
-              <a:t>08-Sep-21</a:t>
+              <a:t>03-May-24</a:t>
             </a:fld>
             <a:endParaRPr lang="en-US"/>
           </a:p>
@@ -5748,7 +5558,7 @@
           </p:cNvGraphicFramePr>
           <p:nvPr userDrawn="1">
             <p:custDataLst>
-              <p:tags r:id="rId8"/>
+              <p:tags r:id="rId9"/>
             </p:custDataLst>
           </p:nvPr>
         </p:nvGraphicFramePr>
@@ -5760,12 +5570,12 @@
           <a:graphicData uri="http://schemas.openxmlformats.org/presentationml/2006/ole">
             <mc:AlternateContent xmlns:mc="http://schemas.openxmlformats.org/markup-compatibility/2006">
               <mc:Choice xmlns:v="urn:schemas-microsoft-com:vml" Requires="v">
-                <p:oleObj name="think-cell Slide" r:id="rId9" imgW="425" imgH="426" progId="TCLayout.ActiveDocument.1">
+                <p:oleObj spid="_x0000_s1026" name="think-cell Slide" r:id="rId10" imgW="425" imgH="426" progId="TCLayout.ActiveDocument.1">
                   <p:embed/>
                 </p:oleObj>
               </mc:Choice>
               <mc:Fallback>
-                <p:oleObj name="think-cell Slide" r:id="rId9" imgW="425" imgH="426" progId="TCLayout.ActiveDocument.1">
+                <p:oleObj name="think-cell Slide" r:id="rId10" imgW="425" imgH="426" progId="TCLayout.ActiveDocument.1">
                   <p:embed/>
                   <p:pic>
                     <p:nvPicPr>
@@ -5774,7 +5584,7 @@
                       <p:nvPr/>
                     </p:nvPicPr>
                     <p:blipFill>
-                      <a:blip r:embed="rId10"/>
+                      <a:blip r:embed="rId11"/>
                       <a:stretch>
                         <a:fillRect/>
                       </a:stretch>
@@ -6289,40 +6099,6 @@
           </a:p>
         </p:txBody>
       </p:sp>
-      <p:pic>
-        <p:nvPicPr>
-          <p:cNvPr id="13" name="Picture 12">
-            <a:extLst>
-              <a:ext uri="{FF2B5EF4-FFF2-40B4-BE49-F238E27FC236}">
-                <a16:creationId xmlns:a16="http://schemas.microsoft.com/office/drawing/2014/main" id="{23304A6A-D15B-47E1-B072-1C47E2C76553}"/>
-              </a:ext>
-            </a:extLst>
-          </p:cNvPr>
-          <p:cNvPicPr/>
-          <p:nvPr userDrawn="1"/>
-        </p:nvPicPr>
-        <p:blipFill>
-          <a:blip r:embed="rId11" cstate="print">
-            <a:extLst>
-              <a:ext uri="{28A0092B-C50C-407E-A947-70E740481C1C}">
-                <a14:useLocalDpi xmlns:a14="http://schemas.microsoft.com/office/drawing/2010/main" val="0"/>
-              </a:ext>
-            </a:extLst>
-          </a:blip>
-          <a:stretch>
-            <a:fillRect/>
-          </a:stretch>
-        </p:blipFill>
-        <p:spPr>
-          <a:xfrm>
-            <a:off x="10755433" y="31710"/>
-            <a:ext cx="1428750" cy="596265"/>
-          </a:xfrm>
-          <a:prstGeom prst="rect">
-            <a:avLst/>
-          </a:prstGeom>
-        </p:spPr>
-      </p:pic>
     </p:spTree>
     <p:extLst>
       <p:ext uri="{BB962C8B-B14F-4D97-AF65-F5344CB8AC3E}">
@@ -6667,7 +6443,7 @@
           </p:cNvGraphicFramePr>
           <p:nvPr userDrawn="1">
             <p:custDataLst>
-              <p:tags r:id="rId6"/>
+              <p:tags r:id="rId7"/>
             </p:custDataLst>
           </p:nvPr>
         </p:nvGraphicFramePr>
@@ -6679,12 +6455,12 @@
           <a:graphicData uri="http://schemas.openxmlformats.org/presentationml/2006/ole">
             <mc:AlternateContent xmlns:mc="http://schemas.openxmlformats.org/markup-compatibility/2006">
               <mc:Choice xmlns:v="urn:schemas-microsoft-com:vml" Requires="v">
-                <p:oleObj name="think-cell Slide" r:id="rId8" imgW="425" imgH="426" progId="TCLayout.ActiveDocument.1">
+                <p:oleObj spid="_x0000_s5122" name="think-cell Slide" r:id="rId9" imgW="425" imgH="426" progId="TCLayout.ActiveDocument.1">
                   <p:embed/>
                 </p:oleObj>
               </mc:Choice>
               <mc:Fallback>
-                <p:oleObj name="think-cell Slide" r:id="rId8" imgW="425" imgH="426" progId="TCLayout.ActiveDocument.1">
+                <p:oleObj name="think-cell Slide" r:id="rId9" imgW="425" imgH="426" progId="TCLayout.ActiveDocument.1">
                   <p:embed/>
                   <p:pic>
                     <p:nvPicPr>
@@ -6693,7 +6469,7 @@
                       <p:nvPr/>
                     </p:nvPicPr>
                     <p:blipFill>
-                      <a:blip r:embed="rId9"/>
+                      <a:blip r:embed="rId10"/>
                       <a:stretch>
                         <a:fillRect/>
                       </a:stretch>
@@ -6726,7 +6502,7 @@
           <p:cNvSpPr/>
           <p:nvPr userDrawn="1">
             <p:custDataLst>
-              <p:tags r:id="rId7"/>
+              <p:tags r:id="rId8"/>
             </p:custDataLst>
           </p:nvPr>
         </p:nvSpPr>
@@ -7265,40 +7041,6 @@
           </a:p>
         </p:txBody>
       </p:sp>
-      <p:pic>
-        <p:nvPicPr>
-          <p:cNvPr id="14" name="Picture 13">
-            <a:extLst>
-              <a:ext uri="{FF2B5EF4-FFF2-40B4-BE49-F238E27FC236}">
-                <a16:creationId xmlns:a16="http://schemas.microsoft.com/office/drawing/2014/main" id="{FDFCD0C7-445F-4A14-9C86-5CF981271CEE}"/>
-              </a:ext>
-            </a:extLst>
-          </p:cNvPr>
-          <p:cNvPicPr/>
-          <p:nvPr userDrawn="1"/>
-        </p:nvPicPr>
-        <p:blipFill>
-          <a:blip r:embed="rId10" cstate="print">
-            <a:extLst>
-              <a:ext uri="{28A0092B-C50C-407E-A947-70E740481C1C}">
-                <a14:useLocalDpi xmlns:a14="http://schemas.microsoft.com/office/drawing/2010/main" val="0"/>
-              </a:ext>
-            </a:extLst>
-          </a:blip>
-          <a:stretch>
-            <a:fillRect/>
-          </a:stretch>
-        </p:blipFill>
-        <p:spPr>
-          <a:xfrm>
-            <a:off x="10736027" y="18414"/>
-            <a:ext cx="1428750" cy="596265"/>
-          </a:xfrm>
-          <a:prstGeom prst="rect">
-            <a:avLst/>
-          </a:prstGeom>
-        </p:spPr>
-      </p:pic>
     </p:spTree>
     <p:extLst>
       <p:ext uri="{BB962C8B-B14F-4D97-AF65-F5344CB8AC3E}">
@@ -8132,8 +7874,8 @@
         </p:nvSpPr>
         <p:spPr>
           <a:xfrm>
-            <a:off x="66351" y="6101561"/>
-            <a:ext cx="12193443" cy="624786"/>
+            <a:off x="6096000" y="2531643"/>
+            <a:ext cx="5896038" cy="624786"/>
           </a:xfrm>
         </p:spPr>
         <p:txBody>
@@ -11177,12 +10919,6 @@
 </file>
 
 <file path=customXml/item1.xml><?xml version="1.0" encoding="utf-8"?>
-<p:properties xmlns:p="http://schemas.microsoft.com/office/2006/metadata/properties" xmlns:xsi="http://www.w3.org/2001/XMLSchema-instance" xmlns:pc="http://schemas.microsoft.com/office/infopath/2007/PartnerControls">
-  <documentManagement/>
-</p:properties>
-</file>
-
-<file path=customXml/item2.xml><?xml version="1.0" encoding="utf-8"?>
 <ct:contentTypeSchema xmlns:ct="http://schemas.microsoft.com/office/2006/metadata/contentType" xmlns:ma="http://schemas.microsoft.com/office/2006/metadata/properties/metaAttributes" ct:_="" ma:_="" ma:contentTypeName="Document" ma:contentTypeID="0x010100319A35104FAE2A48B18B518F397B7CA4" ma:contentTypeVersion="11" ma:contentTypeDescription="Create a new document." ma:contentTypeScope="" ma:versionID="818dfa9a4b3d3bceb1a965a71e647ec2">
   <xsd:schema xmlns:xsd="http://www.w3.org/2001/XMLSchema" xmlns:xs="http://www.w3.org/2001/XMLSchema" xmlns:p="http://schemas.microsoft.com/office/2006/metadata/properties" xmlns:ns2="0931f5f7-8e4d-4a45-a9a6-891693687166" xmlns:ns3="ea0113d3-9d6b-407b-8175-bd70f3cf5591" targetNamespace="http://schemas.microsoft.com/office/2006/metadata/properties" ma:root="true" ma:fieldsID="449ed37a8757c5d6b7757d0e4c8f3a2b" ns2:_="" ns3:_="">
     <xsd:import namespace="0931f5f7-8e4d-4a45-a9a6-891693687166"/>
@@ -11393,6 +11129,12 @@
 </ct:contentTypeSchema>
 </file>
 
+<file path=customXml/item2.xml><?xml version="1.0" encoding="utf-8"?>
+<p:properties xmlns:p="http://schemas.microsoft.com/office/2006/metadata/properties" xmlns:xsi="http://www.w3.org/2001/XMLSchema-instance" xmlns:pc="http://schemas.microsoft.com/office/infopath/2007/PartnerControls">
+  <documentManagement/>
+</p:properties>
+</file>
+
 <file path=customXml/item3.xml><?xml version="1.0" encoding="utf-8"?>
 <?mso-contentType ?>
 <FormTemplates xmlns="http://schemas.microsoft.com/sharepoint/v3/contenttype/forms">
@@ -11403,15 +11145,6 @@
 </file>
 
 <file path=customXml/itemProps1.xml><?xml version="1.0" encoding="utf-8"?>
-<ds:datastoreItem xmlns:ds="http://schemas.openxmlformats.org/officeDocument/2006/customXml" ds:itemID="{C728879B-660B-4583-928D-55E828E68493}">
-  <ds:schemaRefs>
-    <ds:schemaRef ds:uri="http://schemas.microsoft.com/office/2006/metadata/properties"/>
-    <ds:schemaRef ds:uri="http://schemas.microsoft.com/office/infopath/2007/PartnerControls"/>
-  </ds:schemaRefs>
-</ds:datastoreItem>
-</file>
-
-<file path=customXml/itemProps2.xml><?xml version="1.0" encoding="utf-8"?>
 <ds:datastoreItem xmlns:ds="http://schemas.openxmlformats.org/officeDocument/2006/customXml" ds:itemID="{DF1A254C-4026-4073-B28E-6230090BFEFF}">
   <ds:schemaRefs>
     <ds:schemaRef ds:uri="http://schemas.microsoft.com/office/2006/metadata/contentType"/>
@@ -11430,6 +11163,15 @@
 </ds:datastoreItem>
 </file>
 
+<file path=customXml/itemProps2.xml><?xml version="1.0" encoding="utf-8"?>
+<ds:datastoreItem xmlns:ds="http://schemas.openxmlformats.org/officeDocument/2006/customXml" ds:itemID="{C728879B-660B-4583-928D-55E828E68493}">
+  <ds:schemaRefs>
+    <ds:schemaRef ds:uri="http://schemas.microsoft.com/office/2006/metadata/properties"/>
+    <ds:schemaRef ds:uri="http://schemas.microsoft.com/office/infopath/2007/PartnerControls"/>
+  </ds:schemaRefs>
+</ds:datastoreItem>
+</file>
+
 <file path=customXml/itemProps3.xml><?xml version="1.0" encoding="utf-8"?>
 <ds:datastoreItem xmlns:ds="http://schemas.openxmlformats.org/officeDocument/2006/customXml" ds:itemID="{950F9D87-7CA7-4A94-A5E5-A374AFD83891}">
   <ds:schemaRefs>

</xml_diff>